<commit_message>
renaming commands.py and who_plans topic
</commit_message>
<xml_diff>
--- a/Explanation_structure.pptx
+++ b/Explanation_structure.pptx
@@ -2636,7 +2636,7 @@
         <p:spPr>
           <a:xfrm>
             <a:off x="5768975" y="2566035"/>
-            <a:ext cx="2379980" cy="368300"/>
+            <a:ext cx="1605280" cy="368300"/>
           </a:xfrm>
           <a:prstGeom prst="rect">
             <a:avLst/>
@@ -2654,10 +2654,10 @@
           </a:bodyPr>
           <a:p>
             <a:r>
-              <a:rPr lang="" altLang="en-US"/>
-              <a:t>mader_commands.py</a:t>
-            </a:r>
-            <a:endParaRPr lang="" altLang="en-US"/>
+              <a:rPr lang="en-US" altLang="en-US"/>
+              <a:t>commands.py</a:t>
+            </a:r>
+            <a:endParaRPr lang="en-US" altLang="en-US"/>
           </a:p>
         </p:txBody>
       </p:sp>
@@ -2688,10 +2688,10 @@
           </a:bodyPr>
           <a:p>
             <a:r>
-              <a:rPr lang="" altLang="en-US"/>
+              <a:rPr lang="en-US" altLang="en-US"/>
               <a:t>mader_ros.cpp</a:t>
             </a:r>
-            <a:endParaRPr lang="" altLang="en-US"/>
+            <a:endParaRPr lang="en-US" altLang="en-US"/>
           </a:p>
         </p:txBody>
       </p:sp>
@@ -2722,12 +2722,8 @@
           </a:bodyPr>
           <a:p>
             <a:r>
-              <a:rPr lang="" altLang="en-US"/>
-              <a:t>behaviour_selector</a:t>
-            </a:r>
-            <a:r>
               <a:rPr lang="en-US" altLang="en-US"/>
-              <a:t>.py</a:t>
+              <a:t>behaviour_selector.py</a:t>
             </a:r>
             <a:endParaRPr lang="en-US" altLang="en-US"/>
           </a:p>
@@ -2760,7 +2756,7 @@
           </a:bodyPr>
           <a:p>
             <a:r>
-              <a:rPr lang="" altLang="en-US"/>
+              <a:rPr lang="en-US" altLang="en-US"/>
               <a:t>perfect_tracker.py</a:t>
             </a:r>
             <a:endParaRPr lang="en-US" altLang="en-US"/>
@@ -2825,10 +2821,10 @@
           </a:bodyPr>
           <a:p>
             <a:r>
-              <a:rPr lang="" altLang="en-US"/>
+              <a:rPr lang="en-US" altLang="en-US"/>
               <a:t>goal</a:t>
             </a:r>
-            <a:endParaRPr lang="" altLang="en-US"/>
+            <a:endParaRPr lang="en-US" altLang="en-US"/>
           </a:p>
         </p:txBody>
       </p:sp>
@@ -2963,10 +2959,10 @@
           </a:bodyPr>
           <a:p>
             <a:r>
-              <a:rPr lang="" altLang="en-US"/>
+              <a:rPr lang="en-US" altLang="en-US"/>
               <a:t>state</a:t>
             </a:r>
-            <a:endParaRPr lang="" altLang="en-US"/>
+            <a:endParaRPr lang="en-US" altLang="en-US"/>
           </a:p>
         </p:txBody>
       </p:sp>
@@ -3031,24 +3027,24 @@
           </a:bodyPr>
           <a:p>
             <a:r>
-              <a:rPr lang="" altLang="en-US" sz="1000"/>
+              <a:rPr lang="en-US" altLang="en-US" sz="1000"/>
               <a:t>/globalfightmode</a:t>
             </a:r>
-            <a:endParaRPr lang="" altLang="en-US" sz="1000"/>
-          </a:p>
-          <a:p>
-            <a:r>
-              <a:rPr lang="" altLang="en-US" sz="1000"/>
+            <a:endParaRPr lang="en-US" altLang="en-US" sz="1000"/>
+          </a:p>
+          <a:p>
+            <a:r>
+              <a:rPr lang="en-US" altLang="en-US" sz="1000"/>
               <a:t>QuadFlightMode</a:t>
             </a:r>
-            <a:endParaRPr lang="" altLang="en-US" sz="1000"/>
-          </a:p>
-          <a:p>
-            <a:r>
-              <a:rPr lang="" altLang="en-US" sz="1000"/>
+            <a:endParaRPr lang="en-US" altLang="en-US" sz="1000"/>
+          </a:p>
+          <a:p>
+            <a:r>
+              <a:rPr lang="en-US" altLang="en-US" sz="1000"/>
               <a:t>{GO, LAND, KILL}</a:t>
             </a:r>
-            <a:endParaRPr lang="" altLang="en-US" sz="1000"/>
+            <a:endParaRPr lang="en-US" altLang="en-US" sz="1000"/>
           </a:p>
         </p:txBody>
       </p:sp>
@@ -3138,48 +3134,24 @@
           <a:p>
             <a:pPr algn="l"/>
             <a:r>
-              <a:rPr lang="" altLang="en-US" sz="1000"/>
+              <a:rPr lang="en-US" altLang="en-US" sz="1000"/>
               <a:t>/change_mode (it's a service)</a:t>
             </a:r>
-            <a:endParaRPr lang="" altLang="en-US" sz="1000"/>
+            <a:endParaRPr lang="en-US" altLang="en-US" sz="1000"/>
           </a:p>
           <a:p>
             <a:pPr algn="l"/>
             <a:r>
-              <a:rPr lang="" altLang="en-US" sz="1000"/>
+              <a:rPr lang="en-US" altLang="en-US" sz="1000"/>
               <a:t>behavior_selector/MissionModeChange</a:t>
             </a:r>
-            <a:endParaRPr lang="" altLang="en-US" sz="1000"/>
+            <a:endParaRPr lang="en-US" altLang="en-US" sz="1000"/>
           </a:p>
           <a:p>
             <a:pPr algn="l"/>
             <a:r>
               <a:rPr lang="en-US" altLang="en-US" sz="1000"/>
-              <a:t>{</a:t>
-            </a:r>
-            <a:r>
-              <a:rPr lang="" altLang="en-US" sz="1000"/>
-              <a:t>KILL</a:t>
-            </a:r>
-            <a:r>
-              <a:rPr lang="en-US" altLang="en-US" sz="1000"/>
-              <a:t>, </a:t>
-            </a:r>
-            <a:r>
-              <a:rPr lang="" altLang="en-US" sz="1000"/>
-              <a:t>END</a:t>
-            </a:r>
-            <a:r>
-              <a:rPr lang="en-US" altLang="en-US" sz="1000"/>
-              <a:t>, </a:t>
-            </a:r>
-            <a:r>
-              <a:rPr lang="" altLang="en-US" sz="1000"/>
-              <a:t>START</a:t>
-            </a:r>
-            <a:r>
-              <a:rPr lang="en-US" altLang="en-US" sz="1000"/>
-              <a:t>}</a:t>
+              <a:t>{KILL, END, START}</a:t>
             </a:r>
             <a:endParaRPr lang="en-US" altLang="en-US" sz="1000"/>
           </a:p>
@@ -3196,8 +3168,8 @@
         </p:nvCxnSpPr>
         <p:spPr>
           <a:xfrm>
-            <a:off x="8148955" y="2750185"/>
-            <a:ext cx="1588770" cy="0"/>
+            <a:off x="7374255" y="2750185"/>
+            <a:ext cx="2363470" cy="0"/>
           </a:xfrm>
           <a:prstGeom prst="straightConnector1">
             <a:avLst/>
@@ -3247,10 +3219,10 @@
           <a:p>
             <a:pPr algn="l"/>
             <a:r>
-              <a:rPr lang="" altLang="en-US" sz="1000"/>
+              <a:rPr lang="en-US" altLang="en-US" sz="1000"/>
               <a:t>/SQ01s/mader/who_plans</a:t>
             </a:r>
-            <a:endParaRPr lang="" altLang="en-US" sz="1000"/>
+            <a:endParaRPr lang="en-US" altLang="en-US" sz="1000"/>
           </a:p>
           <a:p>
             <a:pPr algn="l"/>
@@ -3264,23 +3236,7 @@
             <a:pPr algn="l"/>
             <a:r>
               <a:rPr lang="en-US" altLang="en-US" sz="1000"/>
-              <a:t>{</a:t>
-            </a:r>
-            <a:r>
-              <a:rPr lang="" altLang="en-US" sz="1000"/>
-              <a:t>MADER</a:t>
-            </a:r>
-            <a:r>
-              <a:rPr lang="en-US" altLang="en-US" sz="1000"/>
-              <a:t>, </a:t>
-            </a:r>
-            <a:r>
-              <a:rPr lang="" altLang="en-US" sz="1000"/>
-              <a:t>OTHER</a:t>
-            </a:r>
-            <a:r>
-              <a:rPr lang="en-US" altLang="en-US" sz="1000"/>
-              <a:t>}</a:t>
+              <a:t>{MADER, OTHER}</a:t>
             </a:r>
             <a:endParaRPr lang="en-US" altLang="en-US" sz="1000"/>
           </a:p>
@@ -3295,7 +3251,7 @@
         <p:spPr>
           <a:xfrm>
             <a:off x="2315845" y="5931535"/>
-            <a:ext cx="8057515" cy="245110"/>
+            <a:ext cx="7626985" cy="245110"/>
           </a:xfrm>
           <a:prstGeom prst="rect">
             <a:avLst/>
@@ -3312,10 +3268,10 @@
           <a:p>
             <a:pPr algn="l"/>
             <a:r>
-              <a:rPr lang="" altLang="en-US" sz="1000"/>
-              <a:t>During takeoff and landing, (and when on the ground/killed), who_plans is OTHER (because mader_commands.py is the one sending goals)</a:t>
-            </a:r>
-            <a:endParaRPr lang="" altLang="en-US" sz="1000"/>
+              <a:rPr lang="en-US" altLang="en-US" sz="1000"/>
+              <a:t>During takeoff and landing, (and when on the ground/killed), who_plans is OTHER (because commands.py is the one sending goals)</a:t>
+            </a:r>
+            <a:endParaRPr lang="en-US" altLang="en-US" sz="1000"/>
           </a:p>
         </p:txBody>
       </p:sp>

</xml_diff>